<commit_message>
code clean up and update readme
</commit_message>
<xml_diff>
--- a/Images/Presentation1.pptx
+++ b/Images/Presentation1.pptx
@@ -6,7 +6,6 @@
   </p:sldMasterIdLst>
   <p:sldIdLst>
     <p:sldId id="256" r:id="rId2"/>
-    <p:sldId id="257" r:id="rId3"/>
   </p:sldIdLst>
   <p:sldSz cx="12192000" cy="6858000"/>
   <p:notesSz cx="6858000" cy="9144000"/>
@@ -262,7 +261,7 @@
           <a:p>
             <a:fld id="{F64478F5-C4E0-EA4D-98CA-F4B84BF3E042}" type="datetimeFigureOut">
               <a:rPr lang="en-US" smtClean="0"/>
-              <a:t>8/14/19</a:t>
+              <a:t>8/26/19</a:t>
             </a:fld>
             <a:endParaRPr lang="en-US"/>
           </a:p>
@@ -462,7 +461,7 @@
           <a:p>
             <a:fld id="{F64478F5-C4E0-EA4D-98CA-F4B84BF3E042}" type="datetimeFigureOut">
               <a:rPr lang="en-US" smtClean="0"/>
-              <a:t>8/14/19</a:t>
+              <a:t>8/26/19</a:t>
             </a:fld>
             <a:endParaRPr lang="en-US"/>
           </a:p>
@@ -672,7 +671,7 @@
           <a:p>
             <a:fld id="{F64478F5-C4E0-EA4D-98CA-F4B84BF3E042}" type="datetimeFigureOut">
               <a:rPr lang="en-US" smtClean="0"/>
-              <a:t>8/14/19</a:t>
+              <a:t>8/26/19</a:t>
             </a:fld>
             <a:endParaRPr lang="en-US"/>
           </a:p>
@@ -872,7 +871,7 @@
           <a:p>
             <a:fld id="{F64478F5-C4E0-EA4D-98CA-F4B84BF3E042}" type="datetimeFigureOut">
               <a:rPr lang="en-US" smtClean="0"/>
-              <a:t>8/14/19</a:t>
+              <a:t>8/26/19</a:t>
             </a:fld>
             <a:endParaRPr lang="en-US"/>
           </a:p>
@@ -1148,7 +1147,7 @@
           <a:p>
             <a:fld id="{F64478F5-C4E0-EA4D-98CA-F4B84BF3E042}" type="datetimeFigureOut">
               <a:rPr lang="en-US" smtClean="0"/>
-              <a:t>8/14/19</a:t>
+              <a:t>8/26/19</a:t>
             </a:fld>
             <a:endParaRPr lang="en-US"/>
           </a:p>
@@ -1416,7 +1415,7 @@
           <a:p>
             <a:fld id="{F64478F5-C4E0-EA4D-98CA-F4B84BF3E042}" type="datetimeFigureOut">
               <a:rPr lang="en-US" smtClean="0"/>
-              <a:t>8/14/19</a:t>
+              <a:t>8/26/19</a:t>
             </a:fld>
             <a:endParaRPr lang="en-US"/>
           </a:p>
@@ -1831,7 +1830,7 @@
           <a:p>
             <a:fld id="{F64478F5-C4E0-EA4D-98CA-F4B84BF3E042}" type="datetimeFigureOut">
               <a:rPr lang="en-US" smtClean="0"/>
-              <a:t>8/14/19</a:t>
+              <a:t>8/26/19</a:t>
             </a:fld>
             <a:endParaRPr lang="en-US"/>
           </a:p>
@@ -1973,7 +1972,7 @@
           <a:p>
             <a:fld id="{F64478F5-C4E0-EA4D-98CA-F4B84BF3E042}" type="datetimeFigureOut">
               <a:rPr lang="en-US" smtClean="0"/>
-              <a:t>8/14/19</a:t>
+              <a:t>8/26/19</a:t>
             </a:fld>
             <a:endParaRPr lang="en-US"/>
           </a:p>
@@ -2086,7 +2085,7 @@
           <a:p>
             <a:fld id="{F64478F5-C4E0-EA4D-98CA-F4B84BF3E042}" type="datetimeFigureOut">
               <a:rPr lang="en-US" smtClean="0"/>
-              <a:t>8/14/19</a:t>
+              <a:t>8/26/19</a:t>
             </a:fld>
             <a:endParaRPr lang="en-US"/>
           </a:p>
@@ -2399,7 +2398,7 @@
           <a:p>
             <a:fld id="{F64478F5-C4E0-EA4D-98CA-F4B84BF3E042}" type="datetimeFigureOut">
               <a:rPr lang="en-US" smtClean="0"/>
-              <a:t>8/14/19</a:t>
+              <a:t>8/26/19</a:t>
             </a:fld>
             <a:endParaRPr lang="en-US"/>
           </a:p>
@@ -2688,7 +2687,7 @@
           <a:p>
             <a:fld id="{F64478F5-C4E0-EA4D-98CA-F4B84BF3E042}" type="datetimeFigureOut">
               <a:rPr lang="en-US" smtClean="0"/>
-              <a:t>8/14/19</a:t>
+              <a:t>8/26/19</a:t>
             </a:fld>
             <a:endParaRPr lang="en-US"/>
           </a:p>
@@ -2931,7 +2930,7 @@
           <a:p>
             <a:fld id="{F64478F5-C4E0-EA4D-98CA-F4B84BF3E042}" type="datetimeFigureOut">
               <a:rPr lang="en-US" smtClean="0"/>
-              <a:t>8/14/19</a:t>
+              <a:t>8/26/19</a:t>
             </a:fld>
             <a:endParaRPr lang="en-US"/>
           </a:p>
@@ -3348,6 +3347,54 @@
           <a:chExt cx="0" cy="0"/>
         </a:xfrm>
       </p:grpSpPr>
+      <p:cxnSp>
+        <p:nvCxnSpPr>
+          <p:cNvPr id="96" name="Elbow Connector 95">
+            <a:extLst>
+              <a:ext uri="{FF2B5EF4-FFF2-40B4-BE49-F238E27FC236}">
+                <a16:creationId xmlns:a16="http://schemas.microsoft.com/office/drawing/2014/main" id="{EC2751F0-9F85-2E44-88A6-BCEC12609E23}"/>
+              </a:ext>
+            </a:extLst>
+          </p:cNvPr>
+          <p:cNvCxnSpPr>
+            <a:cxnSpLocks/>
+            <a:stCxn id="82" idx="3"/>
+            <a:endCxn id="93" idx="2"/>
+          </p:cNvCxnSpPr>
+          <p:nvPr/>
+        </p:nvCxnSpPr>
+        <p:spPr>
+          <a:xfrm flipV="1">
+            <a:off x="4811230" y="2747436"/>
+            <a:ext cx="5716018" cy="996218"/>
+          </a:xfrm>
+          <a:prstGeom prst="bentConnector2">
+            <a:avLst/>
+          </a:prstGeom>
+          <a:ln w="57150" cap="flat">
+            <a:solidFill>
+              <a:srgbClr val="00B0F0"/>
+            </a:solidFill>
+            <a:prstDash val="sysDot"/>
+            <a:round/>
+            <a:tailEnd type="triangle"/>
+          </a:ln>
+        </p:spPr>
+        <p:style>
+          <a:lnRef idx="1">
+            <a:schemeClr val="accent1"/>
+          </a:lnRef>
+          <a:fillRef idx="0">
+            <a:schemeClr val="accent1"/>
+          </a:fillRef>
+          <a:effectRef idx="0">
+            <a:schemeClr val="accent1"/>
+          </a:effectRef>
+          <a:fontRef idx="minor">
+            <a:schemeClr val="tx1"/>
+          </a:fontRef>
+        </p:style>
+      </p:cxnSp>
       <p:sp>
         <p:nvSpPr>
           <p:cNvPr id="5" name="Rectangle 4">
@@ -3362,8 +3409,8 @@
         </p:nvSpPr>
         <p:spPr>
           <a:xfrm>
-            <a:off x="2469931" y="3060497"/>
-            <a:ext cx="180000" cy="540000"/>
+            <a:off x="1852974" y="4680447"/>
+            <a:ext cx="80580" cy="540000"/>
           </a:xfrm>
           <a:prstGeom prst="rect">
             <a:avLst/>
@@ -3390,7 +3437,7 @@
           <a:lstStyle/>
           <a:p>
             <a:pPr algn="ctr"/>
-            <a:endParaRPr lang="en-US"/>
+            <a:endParaRPr lang="en-US" sz="1400"/>
           </a:p>
         </p:txBody>
       </p:sp>
@@ -3408,8 +3455,8 @@
         </p:nvSpPr>
         <p:spPr>
           <a:xfrm>
-            <a:off x="2843893" y="3060497"/>
-            <a:ext cx="180000" cy="540000"/>
+            <a:off x="2226936" y="4680447"/>
+            <a:ext cx="80580" cy="540000"/>
           </a:xfrm>
           <a:prstGeom prst="rect">
             <a:avLst/>
@@ -3436,7 +3483,7 @@
           <a:lstStyle/>
           <a:p>
             <a:pPr algn="ctr"/>
-            <a:endParaRPr lang="en-US"/>
+            <a:endParaRPr lang="en-US" sz="1400"/>
           </a:p>
         </p:txBody>
       </p:sp>
@@ -3454,8 +3501,8 @@
         </p:nvSpPr>
         <p:spPr>
           <a:xfrm>
-            <a:off x="3217855" y="3060497"/>
-            <a:ext cx="180000" cy="540000"/>
+            <a:off x="2600898" y="4680447"/>
+            <a:ext cx="80580" cy="540000"/>
           </a:xfrm>
           <a:prstGeom prst="rect">
             <a:avLst/>
@@ -3482,7 +3529,7 @@
           <a:lstStyle/>
           <a:p>
             <a:pPr algn="ctr"/>
-            <a:endParaRPr lang="en-US"/>
+            <a:endParaRPr lang="en-US" sz="1400"/>
           </a:p>
         </p:txBody>
       </p:sp>
@@ -3500,8 +3547,8 @@
         </p:nvSpPr>
         <p:spPr>
           <a:xfrm>
-            <a:off x="3591817" y="3060497"/>
-            <a:ext cx="180000" cy="540000"/>
+            <a:off x="2974860" y="4680447"/>
+            <a:ext cx="80580" cy="540000"/>
           </a:xfrm>
           <a:prstGeom prst="rect">
             <a:avLst/>
@@ -3528,7 +3575,7 @@
           <a:lstStyle/>
           <a:p>
             <a:pPr algn="ctr"/>
-            <a:endParaRPr lang="en-US"/>
+            <a:endParaRPr lang="en-US" sz="1400"/>
           </a:p>
         </p:txBody>
       </p:sp>
@@ -3546,8 +3593,8 @@
         </p:nvSpPr>
         <p:spPr>
           <a:xfrm>
-            <a:off x="3965779" y="3060497"/>
-            <a:ext cx="180000" cy="540000"/>
+            <a:off x="3348822" y="4680447"/>
+            <a:ext cx="80580" cy="540000"/>
           </a:xfrm>
           <a:prstGeom prst="rect">
             <a:avLst/>
@@ -3574,7 +3621,7 @@
           <a:lstStyle/>
           <a:p>
             <a:pPr algn="ctr"/>
-            <a:endParaRPr lang="en-US"/>
+            <a:endParaRPr lang="en-US" sz="1400"/>
           </a:p>
         </p:txBody>
       </p:sp>
@@ -3592,8 +3639,8 @@
         </p:nvSpPr>
         <p:spPr>
           <a:xfrm>
-            <a:off x="4339741" y="3060497"/>
-            <a:ext cx="180000" cy="540000"/>
+            <a:off x="2082906" y="4680447"/>
+            <a:ext cx="80580" cy="540000"/>
           </a:xfrm>
           <a:prstGeom prst="rect">
             <a:avLst/>
@@ -3620,7 +3667,7 @@
           <a:lstStyle/>
           <a:p>
             <a:pPr algn="ctr"/>
-            <a:endParaRPr lang="en-US"/>
+            <a:endParaRPr lang="en-US" sz="1400"/>
           </a:p>
         </p:txBody>
       </p:sp>
@@ -3638,8 +3685,8 @@
         </p:nvSpPr>
         <p:spPr>
           <a:xfrm>
-            <a:off x="4713703" y="3060497"/>
-            <a:ext cx="180000" cy="540000"/>
+            <a:off x="2456868" y="4680447"/>
+            <a:ext cx="80580" cy="540000"/>
           </a:xfrm>
           <a:prstGeom prst="rect">
             <a:avLst/>
@@ -3666,7 +3713,7 @@
           <a:lstStyle/>
           <a:p>
             <a:pPr algn="ctr"/>
-            <a:endParaRPr lang="en-US"/>
+            <a:endParaRPr lang="en-US" sz="1400"/>
           </a:p>
         </p:txBody>
       </p:sp>
@@ -3684,8 +3731,8 @@
         </p:nvSpPr>
         <p:spPr>
           <a:xfrm>
-            <a:off x="5087668" y="3060497"/>
-            <a:ext cx="180000" cy="540000"/>
+            <a:off x="2830833" y="4680447"/>
+            <a:ext cx="80580" cy="540000"/>
           </a:xfrm>
           <a:prstGeom prst="rect">
             <a:avLst/>
@@ -3712,7 +3759,7 @@
           <a:lstStyle/>
           <a:p>
             <a:pPr algn="ctr"/>
-            <a:endParaRPr lang="en-US"/>
+            <a:endParaRPr lang="en-US" sz="1400"/>
           </a:p>
         </p:txBody>
       </p:sp>
@@ -3730,8 +3777,8 @@
         </p:nvSpPr>
         <p:spPr>
           <a:xfrm>
-            <a:off x="851338" y="3142593"/>
-            <a:ext cx="924612" cy="369332"/>
+            <a:off x="52550" y="4658060"/>
+            <a:ext cx="1784143" cy="584775"/>
           </a:xfrm>
           <a:prstGeom prst="rect">
             <a:avLst/>
@@ -3746,8 +3793,16 @@
           <a:p>
             <a:r>
               <a:rPr lang="en-US" dirty="0"/>
-              <a:t>FX rates</a:t>
-            </a:r>
+              <a:t>FX rates:</a:t>
+            </a:r>
+            <a:br>
+              <a:rPr lang="en-US" dirty="0"/>
+            </a:br>
+            <a:r>
+              <a:rPr lang="en-US" sz="1400" i="1" dirty="0" err="1"/>
+              <a:t>KafkaJsonProducer_fx</a:t>
+            </a:r>
+            <a:endParaRPr lang="en-US" i="1" dirty="0"/>
           </a:p>
         </p:txBody>
       </p:sp>
@@ -3765,12 +3820,15 @@
         </p:nvSpPr>
         <p:spPr>
           <a:xfrm>
-            <a:off x="2469931" y="4222886"/>
-            <a:ext cx="270000" cy="540000"/>
+            <a:off x="1852974" y="5368512"/>
+            <a:ext cx="120870" cy="540000"/>
           </a:xfrm>
           <a:prstGeom prst="rect">
             <a:avLst/>
           </a:prstGeom>
+          <a:solidFill>
+            <a:schemeClr val="accent2"/>
+          </a:solidFill>
         </p:spPr>
         <p:style>
           <a:lnRef idx="2">
@@ -3799,10 +3857,10 @@
       </p:sp>
       <p:sp>
         <p:nvSpPr>
-          <p:cNvPr id="15" name="Rectangle 14">
-            <a:extLst>
-              <a:ext uri="{FF2B5EF4-FFF2-40B4-BE49-F238E27FC236}">
-                <a16:creationId xmlns:a16="http://schemas.microsoft.com/office/drawing/2014/main" id="{0634A269-0CAD-2048-A904-7013CB442039}"/>
+          <p:cNvPr id="17" name="Rectangle 16">
+            <a:extLst>
+              <a:ext uri="{FF2B5EF4-FFF2-40B4-BE49-F238E27FC236}">
+                <a16:creationId xmlns:a16="http://schemas.microsoft.com/office/drawing/2014/main" id="{4B839A4A-36B2-414C-AF04-118D510103C0}"/>
               </a:ext>
             </a:extLst>
           </p:cNvPr>
@@ -3811,12 +3869,15 @@
         </p:nvSpPr>
         <p:spPr>
           <a:xfrm>
-            <a:off x="2831036" y="4222886"/>
-            <a:ext cx="270000" cy="540000"/>
+            <a:off x="3091050" y="5368512"/>
+            <a:ext cx="120870" cy="540000"/>
           </a:xfrm>
           <a:prstGeom prst="rect">
             <a:avLst/>
           </a:prstGeom>
+          <a:solidFill>
+            <a:schemeClr val="accent2"/>
+          </a:solidFill>
         </p:spPr>
         <p:style>
           <a:lnRef idx="2">
@@ -3845,10 +3906,10 @@
       </p:sp>
       <p:sp>
         <p:nvSpPr>
-          <p:cNvPr id="16" name="Rectangle 15">
-            <a:extLst>
-              <a:ext uri="{FF2B5EF4-FFF2-40B4-BE49-F238E27FC236}">
-                <a16:creationId xmlns:a16="http://schemas.microsoft.com/office/drawing/2014/main" id="{B2D0AEE6-02C9-D54D-A015-338B55B8D26E}"/>
+          <p:cNvPr id="18" name="Rectangle 17">
+            <a:extLst>
+              <a:ext uri="{FF2B5EF4-FFF2-40B4-BE49-F238E27FC236}">
+                <a16:creationId xmlns:a16="http://schemas.microsoft.com/office/drawing/2014/main" id="{C06A2BE8-0450-EA44-896F-C4E515E3A189}"/>
               </a:ext>
             </a:extLst>
           </p:cNvPr>
@@ -3857,12 +3918,15 @@
         </p:nvSpPr>
         <p:spPr>
           <a:xfrm>
-            <a:off x="3192141" y="4222886"/>
-            <a:ext cx="270000" cy="540000"/>
+            <a:off x="3297394" y="5368512"/>
+            <a:ext cx="120870" cy="540000"/>
           </a:xfrm>
           <a:prstGeom prst="rect">
             <a:avLst/>
           </a:prstGeom>
+          <a:solidFill>
+            <a:schemeClr val="accent2"/>
+          </a:solidFill>
         </p:spPr>
         <p:style>
           <a:lnRef idx="2">
@@ -3891,10 +3955,10 @@
       </p:sp>
       <p:sp>
         <p:nvSpPr>
-          <p:cNvPr id="17" name="Rectangle 16">
-            <a:extLst>
-              <a:ext uri="{FF2B5EF4-FFF2-40B4-BE49-F238E27FC236}">
-                <a16:creationId xmlns:a16="http://schemas.microsoft.com/office/drawing/2014/main" id="{4B839A4A-36B2-414C-AF04-118D510103C0}"/>
+          <p:cNvPr id="19" name="Rectangle 18">
+            <a:extLst>
+              <a:ext uri="{FF2B5EF4-FFF2-40B4-BE49-F238E27FC236}">
+                <a16:creationId xmlns:a16="http://schemas.microsoft.com/office/drawing/2014/main" id="{A69CCFAE-40C2-9F40-8858-A3C69B286BC6}"/>
               </a:ext>
             </a:extLst>
           </p:cNvPr>
@@ -3903,12 +3967,15 @@
         </p:nvSpPr>
         <p:spPr>
           <a:xfrm>
-            <a:off x="3553246" y="4222886"/>
-            <a:ext cx="270000" cy="540000"/>
+            <a:off x="2059320" y="5368512"/>
+            <a:ext cx="120870" cy="540000"/>
           </a:xfrm>
           <a:prstGeom prst="rect">
             <a:avLst/>
           </a:prstGeom>
+          <a:solidFill>
+            <a:schemeClr val="accent2"/>
+          </a:solidFill>
         </p:spPr>
         <p:style>
           <a:lnRef idx="2">
@@ -3937,10 +4004,10 @@
       </p:sp>
       <p:sp>
         <p:nvSpPr>
-          <p:cNvPr id="18" name="Rectangle 17">
-            <a:extLst>
-              <a:ext uri="{FF2B5EF4-FFF2-40B4-BE49-F238E27FC236}">
-                <a16:creationId xmlns:a16="http://schemas.microsoft.com/office/drawing/2014/main" id="{C06A2BE8-0450-EA44-896F-C4E515E3A189}"/>
+          <p:cNvPr id="20" name="Rectangle 19">
+            <a:extLst>
+              <a:ext uri="{FF2B5EF4-FFF2-40B4-BE49-F238E27FC236}">
+                <a16:creationId xmlns:a16="http://schemas.microsoft.com/office/drawing/2014/main" id="{3F6BBD5D-8F8E-254B-9AD9-B1DDC34E3EA5}"/>
               </a:ext>
             </a:extLst>
           </p:cNvPr>
@@ -3949,12 +4016,15 @@
         </p:nvSpPr>
         <p:spPr>
           <a:xfrm>
-            <a:off x="3914351" y="4222886"/>
-            <a:ext cx="270000" cy="540000"/>
+            <a:off x="2472012" y="5368512"/>
+            <a:ext cx="120870" cy="540000"/>
           </a:xfrm>
           <a:prstGeom prst="rect">
             <a:avLst/>
           </a:prstGeom>
+          <a:solidFill>
+            <a:schemeClr val="accent2"/>
+          </a:solidFill>
         </p:spPr>
         <p:style>
           <a:lnRef idx="2">
@@ -3983,10 +4053,10 @@
       </p:sp>
       <p:sp>
         <p:nvSpPr>
-          <p:cNvPr id="19" name="Rectangle 18">
-            <a:extLst>
-              <a:ext uri="{FF2B5EF4-FFF2-40B4-BE49-F238E27FC236}">
-                <a16:creationId xmlns:a16="http://schemas.microsoft.com/office/drawing/2014/main" id="{A69CCFAE-40C2-9F40-8858-A3C69B286BC6}"/>
+          <p:cNvPr id="21" name="Rectangle 20">
+            <a:extLst>
+              <a:ext uri="{FF2B5EF4-FFF2-40B4-BE49-F238E27FC236}">
+                <a16:creationId xmlns:a16="http://schemas.microsoft.com/office/drawing/2014/main" id="{F622B6CA-EFD1-884A-826B-2231347BFB4B}"/>
               </a:ext>
             </a:extLst>
           </p:cNvPr>
@@ -3995,12 +4065,15 @@
         </p:nvSpPr>
         <p:spPr>
           <a:xfrm>
-            <a:off x="4275456" y="4222886"/>
-            <a:ext cx="270000" cy="540000"/>
+            <a:off x="2884704" y="5368512"/>
+            <a:ext cx="120870" cy="540000"/>
           </a:xfrm>
           <a:prstGeom prst="rect">
             <a:avLst/>
           </a:prstGeom>
+          <a:solidFill>
+            <a:schemeClr val="accent2"/>
+          </a:solidFill>
         </p:spPr>
         <p:style>
           <a:lnRef idx="2">
@@ -4029,24 +4102,69 @@
       </p:sp>
       <p:sp>
         <p:nvSpPr>
-          <p:cNvPr id="20" name="Rectangle 19">
-            <a:extLst>
-              <a:ext uri="{FF2B5EF4-FFF2-40B4-BE49-F238E27FC236}">
-                <a16:creationId xmlns:a16="http://schemas.microsoft.com/office/drawing/2014/main" id="{3F6BBD5D-8F8E-254B-9AD9-B1DDC34E3EA5}"/>
-              </a:ext>
-            </a:extLst>
-          </p:cNvPr>
-          <p:cNvSpPr/>
+          <p:cNvPr id="22" name="TextBox 21">
+            <a:extLst>
+              <a:ext uri="{FF2B5EF4-FFF2-40B4-BE49-F238E27FC236}">
+                <a16:creationId xmlns:a16="http://schemas.microsoft.com/office/drawing/2014/main" id="{2E3C8495-5A66-8F43-AB54-ACC559822D9E}"/>
+              </a:ext>
+            </a:extLst>
+          </p:cNvPr>
+          <p:cNvSpPr txBox="1"/>
           <p:nvPr/>
         </p:nvSpPr>
         <p:spPr>
           <a:xfrm>
-            <a:off x="4636561" y="4222886"/>
-            <a:ext cx="270000" cy="540000"/>
+            <a:off x="52550" y="5379483"/>
+            <a:ext cx="1844095" cy="584775"/>
           </a:xfrm>
           <a:prstGeom prst="rect">
             <a:avLst/>
           </a:prstGeom>
+          <a:noFill/>
+        </p:spPr>
+        <p:txBody>
+          <a:bodyPr wrap="none" rtlCol="0">
+            <a:spAutoFit/>
+          </a:bodyPr>
+          <a:lstStyle/>
+          <a:p>
+            <a:r>
+              <a:rPr lang="en-US" dirty="0"/>
+              <a:t>CC transactions:</a:t>
+            </a:r>
+          </a:p>
+          <a:p>
+            <a:r>
+              <a:rPr lang="en-US" sz="1400" i="1" dirty="0" err="1"/>
+              <a:t>KafkaJsonProducer_trx</a:t>
+            </a:r>
+            <a:endParaRPr lang="en-US" sz="1400" i="1" dirty="0"/>
+          </a:p>
+        </p:txBody>
+      </p:sp>
+      <p:sp>
+        <p:nvSpPr>
+          <p:cNvPr id="24" name="Rectangle 23">
+            <a:extLst>
+              <a:ext uri="{FF2B5EF4-FFF2-40B4-BE49-F238E27FC236}">
+                <a16:creationId xmlns:a16="http://schemas.microsoft.com/office/drawing/2014/main" id="{9F163D19-AAC6-C542-B120-24A64A9E07DB}"/>
+              </a:ext>
+            </a:extLst>
+          </p:cNvPr>
+          <p:cNvSpPr/>
+          <p:nvPr/>
+        </p:nvSpPr>
+        <p:spPr>
+          <a:xfrm>
+            <a:off x="5190028" y="1667437"/>
+            <a:ext cx="1440000" cy="1080000"/>
+          </a:xfrm>
+          <a:prstGeom prst="rect">
+            <a:avLst/>
+          </a:prstGeom>
+          <a:solidFill>
+            <a:schemeClr val="bg1"/>
+          </a:solidFill>
         </p:spPr>
         <p:style>
           <a:lnRef idx="2">
@@ -4065,149 +4183,8 @@
           </a:fontRef>
         </p:style>
         <p:txBody>
-          <a:bodyPr rtlCol="0" anchor="ctr"/>
-          <a:lstStyle/>
-          <a:p>
-            <a:pPr algn="ctr"/>
-            <a:endParaRPr lang="en-US"/>
-          </a:p>
-        </p:txBody>
-      </p:sp>
-      <p:sp>
-        <p:nvSpPr>
-          <p:cNvPr id="21" name="Rectangle 20">
-            <a:extLst>
-              <a:ext uri="{FF2B5EF4-FFF2-40B4-BE49-F238E27FC236}">
-                <a16:creationId xmlns:a16="http://schemas.microsoft.com/office/drawing/2014/main" id="{F622B6CA-EFD1-884A-826B-2231347BFB4B}"/>
-              </a:ext>
-            </a:extLst>
-          </p:cNvPr>
-          <p:cNvSpPr/>
-          <p:nvPr/>
-        </p:nvSpPr>
-        <p:spPr>
-          <a:xfrm>
-            <a:off x="4997668" y="4222886"/>
-            <a:ext cx="270000" cy="540000"/>
-          </a:xfrm>
-          <a:prstGeom prst="rect">
-            <a:avLst/>
-          </a:prstGeom>
-        </p:spPr>
-        <p:style>
-          <a:lnRef idx="2">
-            <a:schemeClr val="accent1">
-              <a:shade val="50000"/>
-            </a:schemeClr>
-          </a:lnRef>
-          <a:fillRef idx="1">
-            <a:schemeClr val="accent1"/>
-          </a:fillRef>
-          <a:effectRef idx="0">
-            <a:schemeClr val="accent1"/>
-          </a:effectRef>
-          <a:fontRef idx="minor">
-            <a:schemeClr val="lt1"/>
-          </a:fontRef>
-        </p:style>
-        <p:txBody>
-          <a:bodyPr rtlCol="0" anchor="ctr"/>
-          <a:lstStyle/>
-          <a:p>
-            <a:pPr algn="ctr"/>
-            <a:endParaRPr lang="en-US"/>
-          </a:p>
-        </p:txBody>
-      </p:sp>
-      <p:sp>
-        <p:nvSpPr>
-          <p:cNvPr id="22" name="TextBox 21">
-            <a:extLst>
-              <a:ext uri="{FF2B5EF4-FFF2-40B4-BE49-F238E27FC236}">
-                <a16:creationId xmlns:a16="http://schemas.microsoft.com/office/drawing/2014/main" id="{2E3C8495-5A66-8F43-AB54-ACC559822D9E}"/>
-              </a:ext>
-            </a:extLst>
-          </p:cNvPr>
-          <p:cNvSpPr txBox="1"/>
-          <p:nvPr/>
-        </p:nvSpPr>
-        <p:spPr>
-          <a:xfrm>
-            <a:off x="851338" y="4304982"/>
-            <a:ext cx="1630639" cy="369332"/>
-          </a:xfrm>
-          <a:prstGeom prst="rect">
-            <a:avLst/>
-          </a:prstGeom>
-          <a:noFill/>
-        </p:spPr>
-        <p:txBody>
-          <a:bodyPr wrap="none" rtlCol="0">
-            <a:spAutoFit/>
-          </a:bodyPr>
-          <a:lstStyle/>
-          <a:p>
-            <a:r>
-              <a:rPr lang="en-US" dirty="0"/>
-              <a:t>CC transactions</a:t>
-            </a:r>
-          </a:p>
-        </p:txBody>
-      </p:sp>
-      <p:sp>
-        <p:nvSpPr>
-          <p:cNvPr id="24" name="Rectangle 23">
-            <a:extLst>
-              <a:ext uri="{FF2B5EF4-FFF2-40B4-BE49-F238E27FC236}">
-                <a16:creationId xmlns:a16="http://schemas.microsoft.com/office/drawing/2014/main" id="{9F163D19-AAC6-C542-B120-24A64A9E07DB}"/>
-              </a:ext>
-            </a:extLst>
-          </p:cNvPr>
-          <p:cNvSpPr/>
-          <p:nvPr/>
-        </p:nvSpPr>
-        <p:spPr>
-          <a:xfrm>
-            <a:off x="8222358" y="957909"/>
-            <a:ext cx="1980000" cy="1440000"/>
-          </a:xfrm>
-          <a:prstGeom prst="rect">
-            <a:avLst/>
-          </a:prstGeom>
-          <a:solidFill>
-            <a:schemeClr val="bg1"/>
-          </a:solidFill>
-        </p:spPr>
-        <p:style>
-          <a:lnRef idx="2">
-            <a:schemeClr val="accent1">
-              <a:shade val="50000"/>
-            </a:schemeClr>
-          </a:lnRef>
-          <a:fillRef idx="1">
-            <a:schemeClr val="accent1"/>
-          </a:fillRef>
-          <a:effectRef idx="0">
-            <a:schemeClr val="accent1"/>
-          </a:effectRef>
-          <a:fontRef idx="minor">
-            <a:schemeClr val="lt1"/>
-          </a:fontRef>
-        </p:style>
-        <p:txBody>
-          <a:bodyPr rtlCol="0" anchor="ctr"/>
-          <a:lstStyle/>
-          <a:p>
-            <a:pPr algn="ctr"/>
-            <a:r>
-              <a:rPr lang="en-US" dirty="0">
-                <a:solidFill>
-                  <a:srgbClr val="FF0000"/>
-                </a:solidFill>
-              </a:rPr>
-              <a:t>Apache Flume</a:t>
-            </a:r>
-          </a:p>
+          <a:bodyPr rtlCol="0" anchor="t"/>
+          <a:lstStyle/>
           <a:p>
             <a:pPr algn="ctr"/>
             <a:r>
@@ -4216,7 +4193,26 @@
                   <a:srgbClr val="FF0000"/>
                 </a:solidFill>
               </a:rPr>
-              <a:t>“JOIN”</a:t>
+              <a:t>Count</a:t>
+            </a:r>
+          </a:p>
+          <a:p>
+            <a:pPr algn="ctr"/>
+            <a:r>
+              <a:rPr lang="en-US" i="1" dirty="0" err="1">
+                <a:solidFill>
+                  <a:schemeClr val="tx1"/>
+                </a:solidFill>
+              </a:rPr>
+              <a:t>trx</a:t>
+            </a:r>
+            <a:r>
+              <a:rPr lang="en-US" i="1" dirty="0">
+                <a:solidFill>
+                  <a:schemeClr val="tx1"/>
+                </a:solidFill>
+              </a:rPr>
+              <a:t> per Shop</a:t>
             </a:r>
           </a:p>
         </p:txBody>
@@ -4232,18 +4228,21 @@
           </p:cNvPr>
           <p:cNvCxnSpPr>
             <a:cxnSpLocks/>
+            <a:stCxn id="2" idx="3"/>
           </p:cNvCxnSpPr>
           <p:nvPr/>
         </p:nvCxnSpPr>
         <p:spPr>
           <a:xfrm flipV="1">
-            <a:off x="6737217" y="2411070"/>
-            <a:ext cx="2059324" cy="1444985"/>
-          </a:xfrm>
-          <a:prstGeom prst="bentConnector2">
-            <a:avLst/>
+            <a:off x="4297308" y="2747436"/>
+            <a:ext cx="4436789" cy="2143300"/>
+          </a:xfrm>
+          <a:prstGeom prst="bentConnector3">
+            <a:avLst>
+              <a:gd name="adj1" fmla="val 99984"/>
+            </a:avLst>
           </a:prstGeom>
-          <a:ln w="127000" cap="flat">
+          <a:ln w="57150" cap="flat">
             <a:prstDash val="sysDot"/>
             <a:round/>
             <a:tailEnd type="triangle"/>
@@ -4276,19 +4275,24 @@
           <p:cNvCxnSpPr>
             <a:cxnSpLocks/>
             <a:stCxn id="24" idx="1"/>
-            <a:endCxn id="23" idx="0"/>
+            <a:endCxn id="58" idx="1"/>
           </p:cNvCxnSpPr>
           <p:nvPr/>
         </p:nvCxnSpPr>
         <p:spPr>
           <a:xfrm rot="10800000" flipV="1">
-            <a:off x="6300994" y="1677909"/>
-            <a:ext cx="1921364" cy="918146"/>
-          </a:xfrm>
-          <a:prstGeom prst="bentConnector2">
-            <a:avLst/>
+            <a:off x="3513054" y="2207436"/>
+            <a:ext cx="1676974" cy="600419"/>
+          </a:xfrm>
+          <a:prstGeom prst="bentConnector3">
+            <a:avLst>
+              <a:gd name="adj1" fmla="val 113632"/>
+            </a:avLst>
           </a:prstGeom>
-          <a:ln w="127000" cap="flat">
+          <a:ln w="57150" cap="flat">
+            <a:solidFill>
+              <a:schemeClr val="accent6"/>
+            </a:solidFill>
             <a:prstDash val="sysDot"/>
             <a:round/>
             <a:tailEnd type="triangle"/>
@@ -4320,18 +4324,23 @@
           </p:cNvPr>
           <p:cNvCxnSpPr>
             <a:cxnSpLocks/>
+            <a:stCxn id="29" idx="3"/>
+            <a:endCxn id="41" idx="2"/>
           </p:cNvCxnSpPr>
           <p:nvPr/>
         </p:nvCxnSpPr>
         <p:spPr>
           <a:xfrm flipV="1">
-            <a:off x="7004106" y="2411070"/>
-            <a:ext cx="2496621" cy="2078578"/>
+            <a:off x="4364634" y="2747436"/>
+            <a:ext cx="4581718" cy="2828126"/>
           </a:xfrm>
           <a:prstGeom prst="bentConnector2">
             <a:avLst/>
           </a:prstGeom>
-          <a:ln w="127000" cap="flat">
+          <a:ln w="57150" cap="flat">
+            <a:solidFill>
+              <a:schemeClr val="accent2"/>
+            </a:solidFill>
             <a:prstDash val="sysDot"/>
             <a:round/>
             <a:tailEnd type="triangle"/>
@@ -4354,10 +4363,10 @@
       </p:cxnSp>
       <p:sp>
         <p:nvSpPr>
-          <p:cNvPr id="23" name="Rectangle 22">
-            <a:extLst>
-              <a:ext uri="{FF2B5EF4-FFF2-40B4-BE49-F238E27FC236}">
-                <a16:creationId xmlns:a16="http://schemas.microsoft.com/office/drawing/2014/main" id="{5916E536-7A61-0440-A179-CC86397B88E3}"/>
+          <p:cNvPr id="41" name="Rectangle 40">
+            <a:extLst>
+              <a:ext uri="{FF2B5EF4-FFF2-40B4-BE49-F238E27FC236}">
+                <a16:creationId xmlns:a16="http://schemas.microsoft.com/office/drawing/2014/main" id="{D3A9D548-25EC-7341-A151-90565966A59B}"/>
               </a:ext>
             </a:extLst>
           </p:cNvPr>
@@ -4366,8 +4375,8 @@
         </p:nvSpPr>
         <p:spPr>
           <a:xfrm>
-            <a:off x="5580994" y="2596055"/>
-            <a:ext cx="1440000" cy="2520000"/>
+            <a:off x="8226352" y="1667436"/>
+            <a:ext cx="1440000" cy="1080000"/>
           </a:xfrm>
           <a:prstGeom prst="rect">
             <a:avLst/>
@@ -4393,7 +4402,7 @@
           </a:fontRef>
         </p:style>
         <p:txBody>
-          <a:bodyPr rtlCol="0" anchor="ctr"/>
+          <a:bodyPr rtlCol="0" anchor="t"/>
           <a:lstStyle/>
           <a:p>
             <a:pPr algn="ctr"/>
@@ -4403,47 +4412,76 @@
                   <a:srgbClr val="FF0000"/>
                 </a:solidFill>
               </a:rPr>
-              <a:t>Apache Kafka</a:t>
-            </a:r>
-          </a:p>
-        </p:txBody>
-      </p:sp>
-    </p:spTree>
-    <p:extLst>
-      <p:ext uri="{BB962C8B-B14F-4D97-AF65-F5344CB8AC3E}">
-        <p14:creationId xmlns:p14="http://schemas.microsoft.com/office/powerpoint/2010/main" val="3768461845"/>
-      </p:ext>
-    </p:extLst>
-  </p:cSld>
-  <p:clrMapOvr>
-    <a:masterClrMapping/>
-  </p:clrMapOvr>
-</p:sld>
-</file>
-
-<file path=ppt/slides/slide2.xml><?xml version="1.0" encoding="utf-8"?>
-<p:sld xmlns:a="http://schemas.openxmlformats.org/drawingml/2006/main" xmlns:r="http://schemas.openxmlformats.org/officeDocument/2006/relationships" xmlns:p="http://schemas.openxmlformats.org/presentationml/2006/main">
-  <p:cSld>
-    <p:spTree>
-      <p:nvGrpSpPr>
-        <p:cNvPr id="1" name=""/>
-        <p:cNvGrpSpPr/>
-        <p:nvPr/>
-      </p:nvGrpSpPr>
-      <p:grpSpPr>
-        <a:xfrm>
-          <a:off x="0" y="0"/>
-          <a:ext cx="0" cy="0"/>
-          <a:chOff x="0" y="0"/>
-          <a:chExt cx="0" cy="0"/>
-        </a:xfrm>
-      </p:grpSpPr>
-      <p:sp>
-        <p:nvSpPr>
-          <p:cNvPr id="5" name="Rectangle 4">
-            <a:extLst>
-              <a:ext uri="{FF2B5EF4-FFF2-40B4-BE49-F238E27FC236}">
-                <a16:creationId xmlns:a16="http://schemas.microsoft.com/office/drawing/2014/main" id="{F1DDBEA5-FD50-0742-A5E9-9FEEE8CE5844}"/>
+              <a:t>JOIN</a:t>
+            </a:r>
+          </a:p>
+          <a:p>
+            <a:pPr algn="ctr"/>
+            <a:r>
+              <a:rPr lang="en-US" sz="1400" i="1" dirty="0">
+                <a:solidFill>
+                  <a:schemeClr val="tx1"/>
+                </a:solidFill>
+              </a:rPr>
+              <a:t>FX &amp; TRX</a:t>
+            </a:r>
+          </a:p>
+        </p:txBody>
+      </p:sp>
+      <p:cxnSp>
+        <p:nvCxnSpPr>
+          <p:cNvPr id="48" name="Elbow Connector 47">
+            <a:extLst>
+              <a:ext uri="{FF2B5EF4-FFF2-40B4-BE49-F238E27FC236}">
+                <a16:creationId xmlns:a16="http://schemas.microsoft.com/office/drawing/2014/main" id="{9FE84FCE-D4D7-644E-9858-3EF48EF31EB5}"/>
+              </a:ext>
+            </a:extLst>
+          </p:cNvPr>
+          <p:cNvCxnSpPr>
+            <a:cxnSpLocks/>
+            <a:stCxn id="29" idx="3"/>
+            <a:endCxn id="24" idx="2"/>
+          </p:cNvCxnSpPr>
+          <p:nvPr/>
+        </p:nvCxnSpPr>
+        <p:spPr>
+          <a:xfrm flipV="1">
+            <a:off x="4364634" y="2747437"/>
+            <a:ext cx="1545394" cy="2828125"/>
+          </a:xfrm>
+          <a:prstGeom prst="bentConnector2">
+            <a:avLst/>
+          </a:prstGeom>
+          <a:ln w="57150" cap="flat">
+            <a:solidFill>
+              <a:schemeClr val="accent2"/>
+            </a:solidFill>
+            <a:prstDash val="sysDot"/>
+            <a:round/>
+            <a:tailEnd type="triangle"/>
+          </a:ln>
+        </p:spPr>
+        <p:style>
+          <a:lnRef idx="1">
+            <a:schemeClr val="accent1"/>
+          </a:lnRef>
+          <a:fillRef idx="0">
+            <a:schemeClr val="accent1"/>
+          </a:fillRef>
+          <a:effectRef idx="0">
+            <a:schemeClr val="accent1"/>
+          </a:effectRef>
+          <a:fontRef idx="minor">
+            <a:schemeClr val="tx1"/>
+          </a:fontRef>
+        </p:style>
+      </p:cxnSp>
+      <p:sp>
+        <p:nvSpPr>
+          <p:cNvPr id="67" name="Rectangle 66">
+            <a:extLst>
+              <a:ext uri="{FF2B5EF4-FFF2-40B4-BE49-F238E27FC236}">
+                <a16:creationId xmlns:a16="http://schemas.microsoft.com/office/drawing/2014/main" id="{58D1D5BD-9CC1-A14D-A854-E780E12F6A4C}"/>
               </a:ext>
             </a:extLst>
           </p:cNvPr>
@@ -4452,12 +4490,15 @@
         </p:nvSpPr>
         <p:spPr>
           <a:xfrm>
-            <a:off x="2469931" y="3060497"/>
-            <a:ext cx="180000" cy="540000"/>
+            <a:off x="6708190" y="1667437"/>
+            <a:ext cx="1440000" cy="1080000"/>
           </a:xfrm>
           <a:prstGeom prst="rect">
             <a:avLst/>
           </a:prstGeom>
+          <a:solidFill>
+            <a:schemeClr val="bg1"/>
+          </a:solidFill>
         </p:spPr>
         <p:style>
           <a:lnRef idx="2">
@@ -4476,828 +4517,8 @@
           </a:fontRef>
         </p:style>
         <p:txBody>
-          <a:bodyPr rtlCol="0" anchor="ctr"/>
-          <a:lstStyle/>
-          <a:p>
-            <a:pPr algn="ctr"/>
-            <a:endParaRPr lang="en-US"/>
-          </a:p>
-        </p:txBody>
-      </p:sp>
-      <p:sp>
-        <p:nvSpPr>
-          <p:cNvPr id="6" name="Rectangle 5">
-            <a:extLst>
-              <a:ext uri="{FF2B5EF4-FFF2-40B4-BE49-F238E27FC236}">
-                <a16:creationId xmlns:a16="http://schemas.microsoft.com/office/drawing/2014/main" id="{81FB7B45-F4BB-A34F-8970-B68B15843A1C}"/>
-              </a:ext>
-            </a:extLst>
-          </p:cNvPr>
-          <p:cNvSpPr/>
-          <p:nvPr/>
-        </p:nvSpPr>
-        <p:spPr>
-          <a:xfrm>
-            <a:off x="2843893" y="3060497"/>
-            <a:ext cx="180000" cy="540000"/>
-          </a:xfrm>
-          <a:prstGeom prst="rect">
-            <a:avLst/>
-          </a:prstGeom>
-        </p:spPr>
-        <p:style>
-          <a:lnRef idx="2">
-            <a:schemeClr val="accent1">
-              <a:shade val="50000"/>
-            </a:schemeClr>
-          </a:lnRef>
-          <a:fillRef idx="1">
-            <a:schemeClr val="accent1"/>
-          </a:fillRef>
-          <a:effectRef idx="0">
-            <a:schemeClr val="accent1"/>
-          </a:effectRef>
-          <a:fontRef idx="minor">
-            <a:schemeClr val="lt1"/>
-          </a:fontRef>
-        </p:style>
-        <p:txBody>
-          <a:bodyPr rtlCol="0" anchor="ctr"/>
-          <a:lstStyle/>
-          <a:p>
-            <a:pPr algn="ctr"/>
-            <a:endParaRPr lang="en-US"/>
-          </a:p>
-        </p:txBody>
-      </p:sp>
-      <p:sp>
-        <p:nvSpPr>
-          <p:cNvPr id="7" name="Rectangle 6">
-            <a:extLst>
-              <a:ext uri="{FF2B5EF4-FFF2-40B4-BE49-F238E27FC236}">
-                <a16:creationId xmlns:a16="http://schemas.microsoft.com/office/drawing/2014/main" id="{FA18D37E-C838-2445-B9A1-540E3F2D74B8}"/>
-              </a:ext>
-            </a:extLst>
-          </p:cNvPr>
-          <p:cNvSpPr/>
-          <p:nvPr/>
-        </p:nvSpPr>
-        <p:spPr>
-          <a:xfrm>
-            <a:off x="3217855" y="3060497"/>
-            <a:ext cx="180000" cy="540000"/>
-          </a:xfrm>
-          <a:prstGeom prst="rect">
-            <a:avLst/>
-          </a:prstGeom>
-        </p:spPr>
-        <p:style>
-          <a:lnRef idx="2">
-            <a:schemeClr val="accent1">
-              <a:shade val="50000"/>
-            </a:schemeClr>
-          </a:lnRef>
-          <a:fillRef idx="1">
-            <a:schemeClr val="accent1"/>
-          </a:fillRef>
-          <a:effectRef idx="0">
-            <a:schemeClr val="accent1"/>
-          </a:effectRef>
-          <a:fontRef idx="minor">
-            <a:schemeClr val="lt1"/>
-          </a:fontRef>
-        </p:style>
-        <p:txBody>
-          <a:bodyPr rtlCol="0" anchor="ctr"/>
-          <a:lstStyle/>
-          <a:p>
-            <a:pPr algn="ctr"/>
-            <a:endParaRPr lang="en-US"/>
-          </a:p>
-        </p:txBody>
-      </p:sp>
-      <p:sp>
-        <p:nvSpPr>
-          <p:cNvPr id="8" name="Rectangle 7">
-            <a:extLst>
-              <a:ext uri="{FF2B5EF4-FFF2-40B4-BE49-F238E27FC236}">
-                <a16:creationId xmlns:a16="http://schemas.microsoft.com/office/drawing/2014/main" id="{5D410DCB-1E04-AF44-8FC0-5B54000DECBE}"/>
-              </a:ext>
-            </a:extLst>
-          </p:cNvPr>
-          <p:cNvSpPr/>
-          <p:nvPr/>
-        </p:nvSpPr>
-        <p:spPr>
-          <a:xfrm>
-            <a:off x="3591817" y="3060497"/>
-            <a:ext cx="180000" cy="540000"/>
-          </a:xfrm>
-          <a:prstGeom prst="rect">
-            <a:avLst/>
-          </a:prstGeom>
-        </p:spPr>
-        <p:style>
-          <a:lnRef idx="2">
-            <a:schemeClr val="accent1">
-              <a:shade val="50000"/>
-            </a:schemeClr>
-          </a:lnRef>
-          <a:fillRef idx="1">
-            <a:schemeClr val="accent1"/>
-          </a:fillRef>
-          <a:effectRef idx="0">
-            <a:schemeClr val="accent1"/>
-          </a:effectRef>
-          <a:fontRef idx="minor">
-            <a:schemeClr val="lt1"/>
-          </a:fontRef>
-        </p:style>
-        <p:txBody>
-          <a:bodyPr rtlCol="0" anchor="ctr"/>
-          <a:lstStyle/>
-          <a:p>
-            <a:pPr algn="ctr"/>
-            <a:endParaRPr lang="en-US"/>
-          </a:p>
-        </p:txBody>
-      </p:sp>
-      <p:sp>
-        <p:nvSpPr>
-          <p:cNvPr id="9" name="Rectangle 8">
-            <a:extLst>
-              <a:ext uri="{FF2B5EF4-FFF2-40B4-BE49-F238E27FC236}">
-                <a16:creationId xmlns:a16="http://schemas.microsoft.com/office/drawing/2014/main" id="{EAAAE9F5-C420-B947-9AA0-ACA162005479}"/>
-              </a:ext>
-            </a:extLst>
-          </p:cNvPr>
-          <p:cNvSpPr/>
-          <p:nvPr/>
-        </p:nvSpPr>
-        <p:spPr>
-          <a:xfrm>
-            <a:off x="3965779" y="3060497"/>
-            <a:ext cx="180000" cy="540000"/>
-          </a:xfrm>
-          <a:prstGeom prst="rect">
-            <a:avLst/>
-          </a:prstGeom>
-        </p:spPr>
-        <p:style>
-          <a:lnRef idx="2">
-            <a:schemeClr val="accent1">
-              <a:shade val="50000"/>
-            </a:schemeClr>
-          </a:lnRef>
-          <a:fillRef idx="1">
-            <a:schemeClr val="accent1"/>
-          </a:fillRef>
-          <a:effectRef idx="0">
-            <a:schemeClr val="accent1"/>
-          </a:effectRef>
-          <a:fontRef idx="minor">
-            <a:schemeClr val="lt1"/>
-          </a:fontRef>
-        </p:style>
-        <p:txBody>
-          <a:bodyPr rtlCol="0" anchor="ctr"/>
-          <a:lstStyle/>
-          <a:p>
-            <a:pPr algn="ctr"/>
-            <a:endParaRPr lang="en-US"/>
-          </a:p>
-        </p:txBody>
-      </p:sp>
-      <p:sp>
-        <p:nvSpPr>
-          <p:cNvPr id="10" name="Rectangle 9">
-            <a:extLst>
-              <a:ext uri="{FF2B5EF4-FFF2-40B4-BE49-F238E27FC236}">
-                <a16:creationId xmlns:a16="http://schemas.microsoft.com/office/drawing/2014/main" id="{AB8EC50A-3EE7-6D4F-86D8-33519CEED4D0}"/>
-              </a:ext>
-            </a:extLst>
-          </p:cNvPr>
-          <p:cNvSpPr/>
-          <p:nvPr/>
-        </p:nvSpPr>
-        <p:spPr>
-          <a:xfrm>
-            <a:off x="4339741" y="3060497"/>
-            <a:ext cx="180000" cy="540000"/>
-          </a:xfrm>
-          <a:prstGeom prst="rect">
-            <a:avLst/>
-          </a:prstGeom>
-        </p:spPr>
-        <p:style>
-          <a:lnRef idx="2">
-            <a:schemeClr val="accent1">
-              <a:shade val="50000"/>
-            </a:schemeClr>
-          </a:lnRef>
-          <a:fillRef idx="1">
-            <a:schemeClr val="accent1"/>
-          </a:fillRef>
-          <a:effectRef idx="0">
-            <a:schemeClr val="accent1"/>
-          </a:effectRef>
-          <a:fontRef idx="minor">
-            <a:schemeClr val="lt1"/>
-          </a:fontRef>
-        </p:style>
-        <p:txBody>
-          <a:bodyPr rtlCol="0" anchor="ctr"/>
-          <a:lstStyle/>
-          <a:p>
-            <a:pPr algn="ctr"/>
-            <a:endParaRPr lang="en-US"/>
-          </a:p>
-        </p:txBody>
-      </p:sp>
-      <p:sp>
-        <p:nvSpPr>
-          <p:cNvPr id="11" name="Rectangle 10">
-            <a:extLst>
-              <a:ext uri="{FF2B5EF4-FFF2-40B4-BE49-F238E27FC236}">
-                <a16:creationId xmlns:a16="http://schemas.microsoft.com/office/drawing/2014/main" id="{AD932EF5-4268-474E-84C5-E9C6D5002D2B}"/>
-              </a:ext>
-            </a:extLst>
-          </p:cNvPr>
-          <p:cNvSpPr/>
-          <p:nvPr/>
-        </p:nvSpPr>
-        <p:spPr>
-          <a:xfrm>
-            <a:off x="4713703" y="3060497"/>
-            <a:ext cx="180000" cy="540000"/>
-          </a:xfrm>
-          <a:prstGeom prst="rect">
-            <a:avLst/>
-          </a:prstGeom>
-        </p:spPr>
-        <p:style>
-          <a:lnRef idx="2">
-            <a:schemeClr val="accent1">
-              <a:shade val="50000"/>
-            </a:schemeClr>
-          </a:lnRef>
-          <a:fillRef idx="1">
-            <a:schemeClr val="accent1"/>
-          </a:fillRef>
-          <a:effectRef idx="0">
-            <a:schemeClr val="accent1"/>
-          </a:effectRef>
-          <a:fontRef idx="minor">
-            <a:schemeClr val="lt1"/>
-          </a:fontRef>
-        </p:style>
-        <p:txBody>
-          <a:bodyPr rtlCol="0" anchor="ctr"/>
-          <a:lstStyle/>
-          <a:p>
-            <a:pPr algn="ctr"/>
-            <a:endParaRPr lang="en-US"/>
-          </a:p>
-        </p:txBody>
-      </p:sp>
-      <p:sp>
-        <p:nvSpPr>
-          <p:cNvPr id="12" name="Rectangle 11">
-            <a:extLst>
-              <a:ext uri="{FF2B5EF4-FFF2-40B4-BE49-F238E27FC236}">
-                <a16:creationId xmlns:a16="http://schemas.microsoft.com/office/drawing/2014/main" id="{F785A403-E6BD-C04B-8DE9-00B3C62AAD08}"/>
-              </a:ext>
-            </a:extLst>
-          </p:cNvPr>
-          <p:cNvSpPr/>
-          <p:nvPr/>
-        </p:nvSpPr>
-        <p:spPr>
-          <a:xfrm>
-            <a:off x="5087668" y="3060497"/>
-            <a:ext cx="180000" cy="540000"/>
-          </a:xfrm>
-          <a:prstGeom prst="rect">
-            <a:avLst/>
-          </a:prstGeom>
-        </p:spPr>
-        <p:style>
-          <a:lnRef idx="2">
-            <a:schemeClr val="accent1">
-              <a:shade val="50000"/>
-            </a:schemeClr>
-          </a:lnRef>
-          <a:fillRef idx="1">
-            <a:schemeClr val="accent1"/>
-          </a:fillRef>
-          <a:effectRef idx="0">
-            <a:schemeClr val="accent1"/>
-          </a:effectRef>
-          <a:fontRef idx="minor">
-            <a:schemeClr val="lt1"/>
-          </a:fontRef>
-        </p:style>
-        <p:txBody>
-          <a:bodyPr rtlCol="0" anchor="ctr"/>
-          <a:lstStyle/>
-          <a:p>
-            <a:pPr algn="ctr"/>
-            <a:endParaRPr lang="en-US"/>
-          </a:p>
-        </p:txBody>
-      </p:sp>
-      <p:sp>
-        <p:nvSpPr>
-          <p:cNvPr id="13" name="TextBox 12">
-            <a:extLst>
-              <a:ext uri="{FF2B5EF4-FFF2-40B4-BE49-F238E27FC236}">
-                <a16:creationId xmlns:a16="http://schemas.microsoft.com/office/drawing/2014/main" id="{1B095BD7-4645-4447-9096-2D58FA255FB8}"/>
-              </a:ext>
-            </a:extLst>
-          </p:cNvPr>
-          <p:cNvSpPr txBox="1"/>
-          <p:nvPr/>
-        </p:nvSpPr>
-        <p:spPr>
-          <a:xfrm>
-            <a:off x="851338" y="3142593"/>
-            <a:ext cx="924612" cy="369332"/>
-          </a:xfrm>
-          <a:prstGeom prst="rect">
-            <a:avLst/>
-          </a:prstGeom>
-          <a:noFill/>
-        </p:spPr>
-        <p:txBody>
-          <a:bodyPr wrap="none" rtlCol="0">
-            <a:spAutoFit/>
-          </a:bodyPr>
-          <a:lstStyle/>
-          <a:p>
-            <a:r>
-              <a:rPr lang="en-US" dirty="0"/>
-              <a:t>FX rates</a:t>
-            </a:r>
-          </a:p>
-        </p:txBody>
-      </p:sp>
-      <p:sp>
-        <p:nvSpPr>
-          <p:cNvPr id="14" name="Rectangle 13">
-            <a:extLst>
-              <a:ext uri="{FF2B5EF4-FFF2-40B4-BE49-F238E27FC236}">
-                <a16:creationId xmlns:a16="http://schemas.microsoft.com/office/drawing/2014/main" id="{1ADF430F-FABA-8944-8A64-F560AD612B08}"/>
-              </a:ext>
-            </a:extLst>
-          </p:cNvPr>
-          <p:cNvSpPr/>
-          <p:nvPr/>
-        </p:nvSpPr>
-        <p:spPr>
-          <a:xfrm>
-            <a:off x="2469931" y="4222886"/>
-            <a:ext cx="270000" cy="540000"/>
-          </a:xfrm>
-          <a:prstGeom prst="rect">
-            <a:avLst/>
-          </a:prstGeom>
-        </p:spPr>
-        <p:style>
-          <a:lnRef idx="2">
-            <a:schemeClr val="accent1">
-              <a:shade val="50000"/>
-            </a:schemeClr>
-          </a:lnRef>
-          <a:fillRef idx="1">
-            <a:schemeClr val="accent1"/>
-          </a:fillRef>
-          <a:effectRef idx="0">
-            <a:schemeClr val="accent1"/>
-          </a:effectRef>
-          <a:fontRef idx="minor">
-            <a:schemeClr val="lt1"/>
-          </a:fontRef>
-        </p:style>
-        <p:txBody>
-          <a:bodyPr rtlCol="0" anchor="ctr"/>
-          <a:lstStyle/>
-          <a:p>
-            <a:pPr algn="ctr"/>
-            <a:endParaRPr lang="en-US"/>
-          </a:p>
-        </p:txBody>
-      </p:sp>
-      <p:sp>
-        <p:nvSpPr>
-          <p:cNvPr id="15" name="Rectangle 14">
-            <a:extLst>
-              <a:ext uri="{FF2B5EF4-FFF2-40B4-BE49-F238E27FC236}">
-                <a16:creationId xmlns:a16="http://schemas.microsoft.com/office/drawing/2014/main" id="{0634A269-0CAD-2048-A904-7013CB442039}"/>
-              </a:ext>
-            </a:extLst>
-          </p:cNvPr>
-          <p:cNvSpPr/>
-          <p:nvPr/>
-        </p:nvSpPr>
-        <p:spPr>
-          <a:xfrm>
-            <a:off x="2831036" y="4222886"/>
-            <a:ext cx="270000" cy="540000"/>
-          </a:xfrm>
-          <a:prstGeom prst="rect">
-            <a:avLst/>
-          </a:prstGeom>
-        </p:spPr>
-        <p:style>
-          <a:lnRef idx="2">
-            <a:schemeClr val="accent1">
-              <a:shade val="50000"/>
-            </a:schemeClr>
-          </a:lnRef>
-          <a:fillRef idx="1">
-            <a:schemeClr val="accent1"/>
-          </a:fillRef>
-          <a:effectRef idx="0">
-            <a:schemeClr val="accent1"/>
-          </a:effectRef>
-          <a:fontRef idx="minor">
-            <a:schemeClr val="lt1"/>
-          </a:fontRef>
-        </p:style>
-        <p:txBody>
-          <a:bodyPr rtlCol="0" anchor="ctr"/>
-          <a:lstStyle/>
-          <a:p>
-            <a:pPr algn="ctr"/>
-            <a:endParaRPr lang="en-US"/>
-          </a:p>
-        </p:txBody>
-      </p:sp>
-      <p:sp>
-        <p:nvSpPr>
-          <p:cNvPr id="16" name="Rectangle 15">
-            <a:extLst>
-              <a:ext uri="{FF2B5EF4-FFF2-40B4-BE49-F238E27FC236}">
-                <a16:creationId xmlns:a16="http://schemas.microsoft.com/office/drawing/2014/main" id="{B2D0AEE6-02C9-D54D-A015-338B55B8D26E}"/>
-              </a:ext>
-            </a:extLst>
-          </p:cNvPr>
-          <p:cNvSpPr/>
-          <p:nvPr/>
-        </p:nvSpPr>
-        <p:spPr>
-          <a:xfrm>
-            <a:off x="3192141" y="4222886"/>
-            <a:ext cx="270000" cy="540000"/>
-          </a:xfrm>
-          <a:prstGeom prst="rect">
-            <a:avLst/>
-          </a:prstGeom>
-        </p:spPr>
-        <p:style>
-          <a:lnRef idx="2">
-            <a:schemeClr val="accent1">
-              <a:shade val="50000"/>
-            </a:schemeClr>
-          </a:lnRef>
-          <a:fillRef idx="1">
-            <a:schemeClr val="accent1"/>
-          </a:fillRef>
-          <a:effectRef idx="0">
-            <a:schemeClr val="accent1"/>
-          </a:effectRef>
-          <a:fontRef idx="minor">
-            <a:schemeClr val="lt1"/>
-          </a:fontRef>
-        </p:style>
-        <p:txBody>
-          <a:bodyPr rtlCol="0" anchor="ctr"/>
-          <a:lstStyle/>
-          <a:p>
-            <a:pPr algn="ctr"/>
-            <a:endParaRPr lang="en-US"/>
-          </a:p>
-        </p:txBody>
-      </p:sp>
-      <p:sp>
-        <p:nvSpPr>
-          <p:cNvPr id="17" name="Rectangle 16">
-            <a:extLst>
-              <a:ext uri="{FF2B5EF4-FFF2-40B4-BE49-F238E27FC236}">
-                <a16:creationId xmlns:a16="http://schemas.microsoft.com/office/drawing/2014/main" id="{4B839A4A-36B2-414C-AF04-118D510103C0}"/>
-              </a:ext>
-            </a:extLst>
-          </p:cNvPr>
-          <p:cNvSpPr/>
-          <p:nvPr/>
-        </p:nvSpPr>
-        <p:spPr>
-          <a:xfrm>
-            <a:off x="3553246" y="4222886"/>
-            <a:ext cx="270000" cy="540000"/>
-          </a:xfrm>
-          <a:prstGeom prst="rect">
-            <a:avLst/>
-          </a:prstGeom>
-        </p:spPr>
-        <p:style>
-          <a:lnRef idx="2">
-            <a:schemeClr val="accent1">
-              <a:shade val="50000"/>
-            </a:schemeClr>
-          </a:lnRef>
-          <a:fillRef idx="1">
-            <a:schemeClr val="accent1"/>
-          </a:fillRef>
-          <a:effectRef idx="0">
-            <a:schemeClr val="accent1"/>
-          </a:effectRef>
-          <a:fontRef idx="minor">
-            <a:schemeClr val="lt1"/>
-          </a:fontRef>
-        </p:style>
-        <p:txBody>
-          <a:bodyPr rtlCol="0" anchor="ctr"/>
-          <a:lstStyle/>
-          <a:p>
-            <a:pPr algn="ctr"/>
-            <a:endParaRPr lang="en-US"/>
-          </a:p>
-        </p:txBody>
-      </p:sp>
-      <p:sp>
-        <p:nvSpPr>
-          <p:cNvPr id="18" name="Rectangle 17">
-            <a:extLst>
-              <a:ext uri="{FF2B5EF4-FFF2-40B4-BE49-F238E27FC236}">
-                <a16:creationId xmlns:a16="http://schemas.microsoft.com/office/drawing/2014/main" id="{C06A2BE8-0450-EA44-896F-C4E515E3A189}"/>
-              </a:ext>
-            </a:extLst>
-          </p:cNvPr>
-          <p:cNvSpPr/>
-          <p:nvPr/>
-        </p:nvSpPr>
-        <p:spPr>
-          <a:xfrm>
-            <a:off x="3914351" y="4222886"/>
-            <a:ext cx="270000" cy="540000"/>
-          </a:xfrm>
-          <a:prstGeom prst="rect">
-            <a:avLst/>
-          </a:prstGeom>
-        </p:spPr>
-        <p:style>
-          <a:lnRef idx="2">
-            <a:schemeClr val="accent1">
-              <a:shade val="50000"/>
-            </a:schemeClr>
-          </a:lnRef>
-          <a:fillRef idx="1">
-            <a:schemeClr val="accent1"/>
-          </a:fillRef>
-          <a:effectRef idx="0">
-            <a:schemeClr val="accent1"/>
-          </a:effectRef>
-          <a:fontRef idx="minor">
-            <a:schemeClr val="lt1"/>
-          </a:fontRef>
-        </p:style>
-        <p:txBody>
-          <a:bodyPr rtlCol="0" anchor="ctr"/>
-          <a:lstStyle/>
-          <a:p>
-            <a:pPr algn="ctr"/>
-            <a:endParaRPr lang="en-US"/>
-          </a:p>
-        </p:txBody>
-      </p:sp>
-      <p:sp>
-        <p:nvSpPr>
-          <p:cNvPr id="19" name="Rectangle 18">
-            <a:extLst>
-              <a:ext uri="{FF2B5EF4-FFF2-40B4-BE49-F238E27FC236}">
-                <a16:creationId xmlns:a16="http://schemas.microsoft.com/office/drawing/2014/main" id="{A69CCFAE-40C2-9F40-8858-A3C69B286BC6}"/>
-              </a:ext>
-            </a:extLst>
-          </p:cNvPr>
-          <p:cNvSpPr/>
-          <p:nvPr/>
-        </p:nvSpPr>
-        <p:spPr>
-          <a:xfrm>
-            <a:off x="4275456" y="4222886"/>
-            <a:ext cx="270000" cy="540000"/>
-          </a:xfrm>
-          <a:prstGeom prst="rect">
-            <a:avLst/>
-          </a:prstGeom>
-        </p:spPr>
-        <p:style>
-          <a:lnRef idx="2">
-            <a:schemeClr val="accent1">
-              <a:shade val="50000"/>
-            </a:schemeClr>
-          </a:lnRef>
-          <a:fillRef idx="1">
-            <a:schemeClr val="accent1"/>
-          </a:fillRef>
-          <a:effectRef idx="0">
-            <a:schemeClr val="accent1"/>
-          </a:effectRef>
-          <a:fontRef idx="minor">
-            <a:schemeClr val="lt1"/>
-          </a:fontRef>
-        </p:style>
-        <p:txBody>
-          <a:bodyPr rtlCol="0" anchor="ctr"/>
-          <a:lstStyle/>
-          <a:p>
-            <a:pPr algn="ctr"/>
-            <a:endParaRPr lang="en-US"/>
-          </a:p>
-        </p:txBody>
-      </p:sp>
-      <p:sp>
-        <p:nvSpPr>
-          <p:cNvPr id="20" name="Rectangle 19">
-            <a:extLst>
-              <a:ext uri="{FF2B5EF4-FFF2-40B4-BE49-F238E27FC236}">
-                <a16:creationId xmlns:a16="http://schemas.microsoft.com/office/drawing/2014/main" id="{3F6BBD5D-8F8E-254B-9AD9-B1DDC34E3EA5}"/>
-              </a:ext>
-            </a:extLst>
-          </p:cNvPr>
-          <p:cNvSpPr/>
-          <p:nvPr/>
-        </p:nvSpPr>
-        <p:spPr>
-          <a:xfrm>
-            <a:off x="4636561" y="4222886"/>
-            <a:ext cx="270000" cy="540000"/>
-          </a:xfrm>
-          <a:prstGeom prst="rect">
-            <a:avLst/>
-          </a:prstGeom>
-        </p:spPr>
-        <p:style>
-          <a:lnRef idx="2">
-            <a:schemeClr val="accent1">
-              <a:shade val="50000"/>
-            </a:schemeClr>
-          </a:lnRef>
-          <a:fillRef idx="1">
-            <a:schemeClr val="accent1"/>
-          </a:fillRef>
-          <a:effectRef idx="0">
-            <a:schemeClr val="accent1"/>
-          </a:effectRef>
-          <a:fontRef idx="minor">
-            <a:schemeClr val="lt1"/>
-          </a:fontRef>
-        </p:style>
-        <p:txBody>
-          <a:bodyPr rtlCol="0" anchor="ctr"/>
-          <a:lstStyle/>
-          <a:p>
-            <a:pPr algn="ctr"/>
-            <a:endParaRPr lang="en-US"/>
-          </a:p>
-        </p:txBody>
-      </p:sp>
-      <p:sp>
-        <p:nvSpPr>
-          <p:cNvPr id="21" name="Rectangle 20">
-            <a:extLst>
-              <a:ext uri="{FF2B5EF4-FFF2-40B4-BE49-F238E27FC236}">
-                <a16:creationId xmlns:a16="http://schemas.microsoft.com/office/drawing/2014/main" id="{F622B6CA-EFD1-884A-826B-2231347BFB4B}"/>
-              </a:ext>
-            </a:extLst>
-          </p:cNvPr>
-          <p:cNvSpPr/>
-          <p:nvPr/>
-        </p:nvSpPr>
-        <p:spPr>
-          <a:xfrm>
-            <a:off x="4997668" y="4222886"/>
-            <a:ext cx="270000" cy="540000"/>
-          </a:xfrm>
-          <a:prstGeom prst="rect">
-            <a:avLst/>
-          </a:prstGeom>
-        </p:spPr>
-        <p:style>
-          <a:lnRef idx="2">
-            <a:schemeClr val="accent1">
-              <a:shade val="50000"/>
-            </a:schemeClr>
-          </a:lnRef>
-          <a:fillRef idx="1">
-            <a:schemeClr val="accent1"/>
-          </a:fillRef>
-          <a:effectRef idx="0">
-            <a:schemeClr val="accent1"/>
-          </a:effectRef>
-          <a:fontRef idx="minor">
-            <a:schemeClr val="lt1"/>
-          </a:fontRef>
-        </p:style>
-        <p:txBody>
-          <a:bodyPr rtlCol="0" anchor="ctr"/>
-          <a:lstStyle/>
-          <a:p>
-            <a:pPr algn="ctr"/>
-            <a:endParaRPr lang="en-US"/>
-          </a:p>
-        </p:txBody>
-      </p:sp>
-      <p:sp>
-        <p:nvSpPr>
-          <p:cNvPr id="22" name="TextBox 21">
-            <a:extLst>
-              <a:ext uri="{FF2B5EF4-FFF2-40B4-BE49-F238E27FC236}">
-                <a16:creationId xmlns:a16="http://schemas.microsoft.com/office/drawing/2014/main" id="{2E3C8495-5A66-8F43-AB54-ACC559822D9E}"/>
-              </a:ext>
-            </a:extLst>
-          </p:cNvPr>
-          <p:cNvSpPr txBox="1"/>
-          <p:nvPr/>
-        </p:nvSpPr>
-        <p:spPr>
-          <a:xfrm>
-            <a:off x="851338" y="4304982"/>
-            <a:ext cx="1630639" cy="369332"/>
-          </a:xfrm>
-          <a:prstGeom prst="rect">
-            <a:avLst/>
-          </a:prstGeom>
-          <a:noFill/>
-        </p:spPr>
-        <p:txBody>
-          <a:bodyPr wrap="none" rtlCol="0">
-            <a:spAutoFit/>
-          </a:bodyPr>
-          <a:lstStyle/>
-          <a:p>
-            <a:r>
-              <a:rPr lang="en-US" dirty="0"/>
-              <a:t>CC transactions</a:t>
-            </a:r>
-          </a:p>
-        </p:txBody>
-      </p:sp>
-      <p:sp>
-        <p:nvSpPr>
-          <p:cNvPr id="24" name="Rectangle 23">
-            <a:extLst>
-              <a:ext uri="{FF2B5EF4-FFF2-40B4-BE49-F238E27FC236}">
-                <a16:creationId xmlns:a16="http://schemas.microsoft.com/office/drawing/2014/main" id="{9F163D19-AAC6-C542-B120-24A64A9E07DB}"/>
-              </a:ext>
-            </a:extLst>
-          </p:cNvPr>
-          <p:cNvSpPr/>
-          <p:nvPr/>
-        </p:nvSpPr>
-        <p:spPr>
-          <a:xfrm>
-            <a:off x="8222358" y="968423"/>
-            <a:ext cx="1980000" cy="1440000"/>
-          </a:xfrm>
-          <a:prstGeom prst="rect">
-            <a:avLst/>
-          </a:prstGeom>
-          <a:solidFill>
-            <a:schemeClr val="bg1"/>
-          </a:solidFill>
-        </p:spPr>
-        <p:style>
-          <a:lnRef idx="2">
-            <a:schemeClr val="accent1">
-              <a:shade val="50000"/>
-            </a:schemeClr>
-          </a:lnRef>
-          <a:fillRef idx="1">
-            <a:schemeClr val="accent1"/>
-          </a:fillRef>
-          <a:effectRef idx="0">
-            <a:schemeClr val="accent1"/>
-          </a:effectRef>
-          <a:fontRef idx="minor">
-            <a:schemeClr val="lt1"/>
-          </a:fontRef>
-        </p:style>
-        <p:txBody>
-          <a:bodyPr rtlCol="0" anchor="ctr"/>
-          <a:lstStyle/>
-          <a:p>
-            <a:pPr algn="ctr"/>
-            <a:r>
-              <a:rPr lang="en-US" dirty="0">
-                <a:solidFill>
-                  <a:srgbClr val="FF0000"/>
-                </a:solidFill>
-              </a:rPr>
-              <a:t>Apache Flume</a:t>
-            </a:r>
-          </a:p>
+          <a:bodyPr rtlCol="0" anchor="t"/>
+          <a:lstStyle/>
           <a:p>
             <a:pPr algn="ctr"/>
             <a:r>
@@ -5306,36 +4527,87 @@
                   <a:srgbClr val="FF0000"/>
                 </a:solidFill>
               </a:rPr>
-              <a:t>“Aggregation”</a:t>
-            </a:r>
+              <a:t>SUM</a:t>
+            </a:r>
+          </a:p>
+          <a:p>
+            <a:pPr algn="ctr"/>
+            <a:r>
+              <a:rPr lang="en-US" i="1" dirty="0" err="1">
+                <a:solidFill>
+                  <a:schemeClr val="tx1"/>
+                </a:solidFill>
+              </a:rPr>
+              <a:t>ccid</a:t>
+            </a:r>
+            <a:r>
+              <a:rPr lang="en-US" i="1" dirty="0">
+                <a:solidFill>
+                  <a:schemeClr val="tx1"/>
+                </a:solidFill>
+              </a:rPr>
+              <a:t>/</a:t>
+            </a:r>
+            <a:r>
+              <a:rPr lang="en-US" i="1" dirty="0" err="1">
+                <a:solidFill>
+                  <a:schemeClr val="tx1"/>
+                </a:solidFill>
+              </a:rPr>
+              <a:t>trx</a:t>
+            </a:r>
+            <a:r>
+              <a:rPr lang="en-US" i="1" dirty="0">
+                <a:solidFill>
+                  <a:schemeClr val="tx1"/>
+                </a:solidFill>
+              </a:rPr>
+              <a:t>/</a:t>
+            </a:r>
+            <a:r>
+              <a:rPr lang="en-US" i="1" dirty="0" err="1">
+                <a:solidFill>
+                  <a:schemeClr val="tx1"/>
+                </a:solidFill>
+              </a:rPr>
+              <a:t>fx</a:t>
+            </a:r>
+            <a:endParaRPr lang="en-US" i="1" dirty="0">
+              <a:solidFill>
+                <a:schemeClr val="tx1"/>
+              </a:solidFill>
+            </a:endParaRPr>
           </a:p>
         </p:txBody>
       </p:sp>
       <p:cxnSp>
         <p:nvCxnSpPr>
-          <p:cNvPr id="27" name="Elbow Connector 26">
-            <a:extLst>
-              <a:ext uri="{FF2B5EF4-FFF2-40B4-BE49-F238E27FC236}">
-                <a16:creationId xmlns:a16="http://schemas.microsoft.com/office/drawing/2014/main" id="{A34E17C7-3066-F547-9DB4-E1B94AFF1D0C}"/>
+          <p:cNvPr id="68" name="Elbow Connector 67">
+            <a:extLst>
+              <a:ext uri="{FF2B5EF4-FFF2-40B4-BE49-F238E27FC236}">
+                <a16:creationId xmlns:a16="http://schemas.microsoft.com/office/drawing/2014/main" id="{2EF66033-85E1-5844-A859-E894D08DB99E}"/>
               </a:ext>
             </a:extLst>
           </p:cNvPr>
           <p:cNvCxnSpPr>
             <a:cxnSpLocks/>
-            <a:stCxn id="24" idx="1"/>
-            <a:endCxn id="23" idx="0"/>
+            <a:stCxn id="29" idx="3"/>
+            <a:endCxn id="67" idx="2"/>
           </p:cNvCxnSpPr>
           <p:nvPr/>
         </p:nvCxnSpPr>
         <p:spPr>
-          <a:xfrm rot="10800000" flipV="1">
-            <a:off x="6300994" y="1688423"/>
-            <a:ext cx="1921364" cy="907632"/>
+          <a:xfrm flipV="1">
+            <a:off x="4364634" y="2747437"/>
+            <a:ext cx="3063556" cy="2828125"/>
           </a:xfrm>
           <a:prstGeom prst="bentConnector2">
             <a:avLst/>
           </a:prstGeom>
-          <a:ln w="127000" cap="flat">
+          <a:ln w="57150" cap="flat">
+            <a:solidFill>
+              <a:schemeClr val="accent2"/>
+            </a:solidFill>
             <a:prstDash val="sysDot"/>
             <a:round/>
             <a:tailEnd type="triangle"/>
@@ -5358,27 +4630,35 @@
       </p:cxnSp>
       <p:cxnSp>
         <p:nvCxnSpPr>
-          <p:cNvPr id="28" name="Elbow Connector 27">
-            <a:extLst>
-              <a:ext uri="{FF2B5EF4-FFF2-40B4-BE49-F238E27FC236}">
-                <a16:creationId xmlns:a16="http://schemas.microsoft.com/office/drawing/2014/main" id="{CB79EB08-7FDC-6D4A-B208-65AF456B2EA9}"/>
+          <p:cNvPr id="78" name="Elbow Connector 77">
+            <a:extLst>
+              <a:ext uri="{FF2B5EF4-FFF2-40B4-BE49-F238E27FC236}">
+                <a16:creationId xmlns:a16="http://schemas.microsoft.com/office/drawing/2014/main" id="{4B1AD8CB-DE01-9D4F-9D04-83B058F91FD3}"/>
               </a:ext>
             </a:extLst>
           </p:cNvPr>
           <p:cNvCxnSpPr>
             <a:cxnSpLocks/>
+            <a:stCxn id="67" idx="0"/>
+            <a:endCxn id="36" idx="1"/>
           </p:cNvCxnSpPr>
           <p:nvPr/>
         </p:nvCxnSpPr>
         <p:spPr>
-          <a:xfrm flipV="1">
-            <a:off x="7004106" y="2411070"/>
-            <a:ext cx="2496621" cy="2078578"/>
-          </a:xfrm>
-          <a:prstGeom prst="bentConnector2">
-            <a:avLst/>
+          <a:xfrm rot="16200000" flipH="1" flipV="1">
+            <a:off x="4666463" y="514028"/>
+            <a:ext cx="1608318" cy="3915136"/>
+          </a:xfrm>
+          <a:prstGeom prst="bentConnector4">
+            <a:avLst>
+              <a:gd name="adj1" fmla="val -14214"/>
+              <a:gd name="adj2" fmla="val 109866"/>
+            </a:avLst>
           </a:prstGeom>
-          <a:ln w="127000" cap="flat">
+          <a:ln w="57150" cap="flat">
+            <a:solidFill>
+              <a:schemeClr val="accent6"/>
+            </a:solidFill>
             <a:prstDash val="sysDot"/>
             <a:round/>
             <a:tailEnd type="triangle"/>
@@ -5399,6 +4679,57 @@
           </a:fontRef>
         </p:style>
       </p:cxnSp>
+      <p:cxnSp>
+        <p:nvCxnSpPr>
+          <p:cNvPr id="86" name="Elbow Connector 85">
+            <a:extLst>
+              <a:ext uri="{FF2B5EF4-FFF2-40B4-BE49-F238E27FC236}">
+                <a16:creationId xmlns:a16="http://schemas.microsoft.com/office/drawing/2014/main" id="{9CFC1930-ACFC-2D4A-8FC3-274CF97DFC56}"/>
+              </a:ext>
+            </a:extLst>
+          </p:cNvPr>
+          <p:cNvCxnSpPr>
+            <a:cxnSpLocks/>
+            <a:stCxn id="41" idx="0"/>
+            <a:endCxn id="82" idx="1"/>
+          </p:cNvCxnSpPr>
+          <p:nvPr/>
+        </p:nvCxnSpPr>
+        <p:spPr>
+          <a:xfrm rot="16200000" flipH="1" flipV="1">
+            <a:off x="5191594" y="-11104"/>
+            <a:ext cx="2076218" cy="5433298"/>
+          </a:xfrm>
+          <a:prstGeom prst="bentConnector4">
+            <a:avLst>
+              <a:gd name="adj1" fmla="val -16072"/>
+              <a:gd name="adj2" fmla="val 109430"/>
+            </a:avLst>
+          </a:prstGeom>
+          <a:ln w="57150" cap="flat">
+            <a:solidFill>
+              <a:schemeClr val="accent6"/>
+            </a:solidFill>
+            <a:prstDash val="sysDot"/>
+            <a:round/>
+            <a:tailEnd type="triangle"/>
+          </a:ln>
+        </p:spPr>
+        <p:style>
+          <a:lnRef idx="1">
+            <a:schemeClr val="accent1"/>
+          </a:lnRef>
+          <a:fillRef idx="0">
+            <a:schemeClr val="accent1"/>
+          </a:fillRef>
+          <a:effectRef idx="0">
+            <a:schemeClr val="accent1"/>
+          </a:effectRef>
+          <a:fontRef idx="minor">
+            <a:schemeClr val="tx1"/>
+          </a:fontRef>
+        </p:style>
+      </p:cxnSp>
       <p:sp>
         <p:nvSpPr>
           <p:cNvPr id="23" name="Rectangle 22">
@@ -5413,8 +4744,8 @@
         </p:nvSpPr>
         <p:spPr>
           <a:xfrm>
-            <a:off x="5580994" y="2596055"/>
-            <a:ext cx="1440000" cy="2520000"/>
+            <a:off x="3503738" y="2546853"/>
+            <a:ext cx="1440000" cy="3594538"/>
           </a:xfrm>
           <a:prstGeom prst="rect">
             <a:avLst/>
@@ -5440,7 +4771,7 @@
           </a:fontRef>
         </p:style>
         <p:txBody>
-          <a:bodyPr rtlCol="0" anchor="ctr"/>
+          <a:bodyPr rtlCol="0" anchor="b"/>
           <a:lstStyle/>
           <a:p>
             <a:pPr algn="ctr"/>
@@ -5450,15 +4781,397 @@
                   <a:srgbClr val="FF0000"/>
                 </a:solidFill>
               </a:rPr>
-              <a:t>Apache Kafka</a:t>
-            </a:r>
-          </a:p>
-        </p:txBody>
-      </p:sp>
+              <a:t>Kafka</a:t>
+            </a:r>
+          </a:p>
+        </p:txBody>
+      </p:sp>
+      <p:sp>
+        <p:nvSpPr>
+          <p:cNvPr id="2" name="TextBox 1">
+            <a:extLst>
+              <a:ext uri="{FF2B5EF4-FFF2-40B4-BE49-F238E27FC236}">
+                <a16:creationId xmlns:a16="http://schemas.microsoft.com/office/drawing/2014/main" id="{E93C9F32-EBD6-8849-A4F7-650D924A9A37}"/>
+              </a:ext>
+            </a:extLst>
+          </p:cNvPr>
+          <p:cNvSpPr txBox="1"/>
+          <p:nvPr/>
+        </p:nvSpPr>
+        <p:spPr>
+          <a:xfrm>
+            <a:off x="3513054" y="4736847"/>
+            <a:ext cx="784254" cy="307777"/>
+          </a:xfrm>
+          <a:prstGeom prst="rect">
+            <a:avLst/>
+          </a:prstGeom>
+          <a:noFill/>
+        </p:spPr>
+        <p:txBody>
+          <a:bodyPr wrap="none" rtlCol="0">
+            <a:spAutoFit/>
+          </a:bodyPr>
+          <a:lstStyle/>
+          <a:p>
+            <a:r>
+              <a:rPr lang="en-US" sz="1400" dirty="0"/>
+              <a:t>Topic: </a:t>
+            </a:r>
+            <a:r>
+              <a:rPr lang="en-US" sz="1400" i="1" dirty="0" err="1"/>
+              <a:t>fx</a:t>
+            </a:r>
+            <a:endParaRPr lang="en-US" sz="1400" i="1" dirty="0"/>
+          </a:p>
+        </p:txBody>
+      </p:sp>
+      <p:sp>
+        <p:nvSpPr>
+          <p:cNvPr id="29" name="TextBox 28">
+            <a:extLst>
+              <a:ext uri="{FF2B5EF4-FFF2-40B4-BE49-F238E27FC236}">
+                <a16:creationId xmlns:a16="http://schemas.microsoft.com/office/drawing/2014/main" id="{61F7A0E8-38E5-224E-A5F6-B1018B8CBC9F}"/>
+              </a:ext>
+            </a:extLst>
+          </p:cNvPr>
+          <p:cNvSpPr txBox="1"/>
+          <p:nvPr/>
+        </p:nvSpPr>
+        <p:spPr>
+          <a:xfrm>
+            <a:off x="3513054" y="5421673"/>
+            <a:ext cx="851580" cy="307777"/>
+          </a:xfrm>
+          <a:prstGeom prst="rect">
+            <a:avLst/>
+          </a:prstGeom>
+          <a:noFill/>
+        </p:spPr>
+        <p:txBody>
+          <a:bodyPr wrap="none" rtlCol="0">
+            <a:spAutoFit/>
+          </a:bodyPr>
+          <a:lstStyle/>
+          <a:p>
+            <a:r>
+              <a:rPr lang="en-US" sz="1400" dirty="0"/>
+              <a:t>Topic: </a:t>
+            </a:r>
+            <a:r>
+              <a:rPr lang="en-US" sz="1400" i="1" dirty="0" err="1"/>
+              <a:t>trx</a:t>
+            </a:r>
+            <a:endParaRPr lang="en-US" sz="1400" i="1" dirty="0"/>
+          </a:p>
+        </p:txBody>
+      </p:sp>
+      <p:sp>
+        <p:nvSpPr>
+          <p:cNvPr id="36" name="TextBox 35">
+            <a:extLst>
+              <a:ext uri="{FF2B5EF4-FFF2-40B4-BE49-F238E27FC236}">
+                <a16:creationId xmlns:a16="http://schemas.microsoft.com/office/drawing/2014/main" id="{5DCFA7C9-DD74-7C4F-86B7-C2DF6E6C3710}"/>
+              </a:ext>
+            </a:extLst>
+          </p:cNvPr>
+          <p:cNvSpPr txBox="1"/>
+          <p:nvPr/>
+        </p:nvSpPr>
+        <p:spPr>
+          <a:xfrm>
+            <a:off x="3513054" y="3014145"/>
+            <a:ext cx="1298176" cy="523220"/>
+          </a:xfrm>
+          <a:prstGeom prst="rect">
+            <a:avLst/>
+          </a:prstGeom>
+          <a:noFill/>
+        </p:spPr>
+        <p:txBody>
+          <a:bodyPr wrap="none" rtlCol="0">
+            <a:spAutoFit/>
+          </a:bodyPr>
+          <a:lstStyle/>
+          <a:p>
+            <a:r>
+              <a:rPr lang="en-US" sz="1400" dirty="0"/>
+              <a:t>Topic: </a:t>
+            </a:r>
+            <a:br>
+              <a:rPr lang="en-US" sz="1400" dirty="0"/>
+            </a:br>
+            <a:r>
+              <a:rPr lang="en-US" sz="1400" i="1" dirty="0" err="1"/>
+              <a:t>SumCcIdFxAmt</a:t>
+            </a:r>
+            <a:endParaRPr lang="en-US" sz="1400" i="1" dirty="0"/>
+          </a:p>
+        </p:txBody>
+      </p:sp>
+      <p:sp>
+        <p:nvSpPr>
+          <p:cNvPr id="58" name="TextBox 57">
+            <a:extLst>
+              <a:ext uri="{FF2B5EF4-FFF2-40B4-BE49-F238E27FC236}">
+                <a16:creationId xmlns:a16="http://schemas.microsoft.com/office/drawing/2014/main" id="{F9E91F25-D0C7-DE4E-833A-DDFBF33316AA}"/>
+              </a:ext>
+            </a:extLst>
+          </p:cNvPr>
+          <p:cNvSpPr txBox="1"/>
+          <p:nvPr/>
+        </p:nvSpPr>
+        <p:spPr>
+          <a:xfrm>
+            <a:off x="3513054" y="2546246"/>
+            <a:ext cx="1449051" cy="523220"/>
+          </a:xfrm>
+          <a:prstGeom prst="rect">
+            <a:avLst/>
+          </a:prstGeom>
+          <a:noFill/>
+        </p:spPr>
+        <p:txBody>
+          <a:bodyPr wrap="none" rtlCol="0">
+            <a:spAutoFit/>
+          </a:bodyPr>
+          <a:lstStyle/>
+          <a:p>
+            <a:r>
+              <a:rPr lang="en-US" sz="1400" dirty="0"/>
+              <a:t>Topic: </a:t>
+            </a:r>
+            <a:br>
+              <a:rPr lang="en-US" sz="1400" dirty="0"/>
+            </a:br>
+            <a:r>
+              <a:rPr lang="en-US" sz="1400" i="1" dirty="0" err="1"/>
+              <a:t>CountTrxPerShop</a:t>
+            </a:r>
+            <a:endParaRPr lang="en-US" sz="1400" i="1" dirty="0"/>
+          </a:p>
+        </p:txBody>
+      </p:sp>
+      <p:sp>
+        <p:nvSpPr>
+          <p:cNvPr id="82" name="TextBox 81">
+            <a:extLst>
+              <a:ext uri="{FF2B5EF4-FFF2-40B4-BE49-F238E27FC236}">
+                <a16:creationId xmlns:a16="http://schemas.microsoft.com/office/drawing/2014/main" id="{D15220AC-6A2C-1341-B71B-B124E4949070}"/>
+              </a:ext>
+            </a:extLst>
+          </p:cNvPr>
+          <p:cNvSpPr txBox="1"/>
+          <p:nvPr/>
+        </p:nvSpPr>
+        <p:spPr>
+          <a:xfrm>
+            <a:off x="3513054" y="3482044"/>
+            <a:ext cx="1298176" cy="523220"/>
+          </a:xfrm>
+          <a:prstGeom prst="rect">
+            <a:avLst/>
+          </a:prstGeom>
+          <a:noFill/>
+        </p:spPr>
+        <p:txBody>
+          <a:bodyPr wrap="none" rtlCol="0">
+            <a:spAutoFit/>
+          </a:bodyPr>
+          <a:lstStyle/>
+          <a:p>
+            <a:r>
+              <a:rPr lang="en-US" sz="1400" dirty="0"/>
+              <a:t>Topic: </a:t>
+            </a:r>
+            <a:br>
+              <a:rPr lang="en-US" sz="1400" dirty="0"/>
+            </a:br>
+            <a:r>
+              <a:rPr lang="en-US" sz="1400" i="1" dirty="0" err="1"/>
+              <a:t>TrxFxCombined</a:t>
+            </a:r>
+            <a:endParaRPr lang="en-US" sz="1400" i="1" dirty="0"/>
+          </a:p>
+        </p:txBody>
+      </p:sp>
+      <p:sp>
+        <p:nvSpPr>
+          <p:cNvPr id="93" name="Rectangle 92">
+            <a:extLst>
+              <a:ext uri="{FF2B5EF4-FFF2-40B4-BE49-F238E27FC236}">
+                <a16:creationId xmlns:a16="http://schemas.microsoft.com/office/drawing/2014/main" id="{B896FDD1-631E-F745-AFCD-560A74784933}"/>
+              </a:ext>
+            </a:extLst>
+          </p:cNvPr>
+          <p:cNvSpPr/>
+          <p:nvPr/>
+        </p:nvSpPr>
+        <p:spPr>
+          <a:xfrm>
+            <a:off x="9807248" y="1667436"/>
+            <a:ext cx="1440000" cy="1080000"/>
+          </a:xfrm>
+          <a:prstGeom prst="rect">
+            <a:avLst/>
+          </a:prstGeom>
+          <a:solidFill>
+            <a:schemeClr val="bg1"/>
+          </a:solidFill>
+        </p:spPr>
+        <p:style>
+          <a:lnRef idx="2">
+            <a:schemeClr val="accent1">
+              <a:shade val="50000"/>
+            </a:schemeClr>
+          </a:lnRef>
+          <a:fillRef idx="1">
+            <a:schemeClr val="accent1"/>
+          </a:fillRef>
+          <a:effectRef idx="0">
+            <a:schemeClr val="accent1"/>
+          </a:effectRef>
+          <a:fontRef idx="minor">
+            <a:schemeClr val="lt1"/>
+          </a:fontRef>
+        </p:style>
+        <p:txBody>
+          <a:bodyPr rtlCol="0" anchor="t"/>
+          <a:lstStyle/>
+          <a:p>
+            <a:pPr algn="ctr"/>
+            <a:r>
+              <a:rPr lang="en-US" sz="2400" dirty="0">
+                <a:solidFill>
+                  <a:srgbClr val="FF0000"/>
+                </a:solidFill>
+              </a:rPr>
+              <a:t>Table</a:t>
+            </a:r>
+          </a:p>
+          <a:p>
+            <a:pPr algn="ctr"/>
+            <a:r>
+              <a:rPr lang="en-US" sz="1400" i="1" dirty="0" err="1">
+                <a:solidFill>
+                  <a:schemeClr val="tx1"/>
+                </a:solidFill>
+              </a:rPr>
+              <a:t>FxRisk</a:t>
+            </a:r>
+            <a:r>
+              <a:rPr lang="en-US" sz="1400" i="1" dirty="0">
+                <a:solidFill>
+                  <a:schemeClr val="tx1"/>
+                </a:solidFill>
+              </a:rPr>
+              <a:t> Calculator</a:t>
+            </a:r>
+          </a:p>
+        </p:txBody>
+      </p:sp>
+      <p:sp>
+        <p:nvSpPr>
+          <p:cNvPr id="100" name="TextBox 99">
+            <a:extLst>
+              <a:ext uri="{FF2B5EF4-FFF2-40B4-BE49-F238E27FC236}">
+                <a16:creationId xmlns:a16="http://schemas.microsoft.com/office/drawing/2014/main" id="{DD43EEB7-FB5E-C24F-86FD-6DEF0575EC8B}"/>
+              </a:ext>
+            </a:extLst>
+          </p:cNvPr>
+          <p:cNvSpPr txBox="1"/>
+          <p:nvPr/>
+        </p:nvSpPr>
+        <p:spPr>
+          <a:xfrm>
+            <a:off x="3513054" y="3951078"/>
+            <a:ext cx="953787" cy="523220"/>
+          </a:xfrm>
+          <a:prstGeom prst="rect">
+            <a:avLst/>
+          </a:prstGeom>
+          <a:noFill/>
+        </p:spPr>
+        <p:txBody>
+          <a:bodyPr wrap="none" rtlCol="0">
+            <a:spAutoFit/>
+          </a:bodyPr>
+          <a:lstStyle/>
+          <a:p>
+            <a:r>
+              <a:rPr lang="en-US" sz="1400" dirty="0"/>
+              <a:t>Topic: </a:t>
+            </a:r>
+            <a:br>
+              <a:rPr lang="en-US" sz="1400" dirty="0"/>
+            </a:br>
+            <a:r>
+              <a:rPr lang="en-US" sz="1400" dirty="0" err="1"/>
+              <a:t>FX</a:t>
+            </a:r>
+            <a:r>
+              <a:rPr lang="en-US" sz="1400" i="1" dirty="0" err="1"/>
+              <a:t>RiskCalc</a:t>
+            </a:r>
+            <a:endParaRPr lang="en-US" sz="1400" i="1" dirty="0"/>
+          </a:p>
+        </p:txBody>
+      </p:sp>
+      <p:cxnSp>
+        <p:nvCxnSpPr>
+          <p:cNvPr id="110" name="Elbow Connector 109">
+            <a:extLst>
+              <a:ext uri="{FF2B5EF4-FFF2-40B4-BE49-F238E27FC236}">
+                <a16:creationId xmlns:a16="http://schemas.microsoft.com/office/drawing/2014/main" id="{B7BFB42B-76A6-4943-A3DE-A4C874675B38}"/>
+              </a:ext>
+            </a:extLst>
+          </p:cNvPr>
+          <p:cNvCxnSpPr>
+            <a:cxnSpLocks/>
+            <a:stCxn id="93" idx="0"/>
+            <a:endCxn id="100" idx="1"/>
+          </p:cNvCxnSpPr>
+          <p:nvPr/>
+        </p:nvCxnSpPr>
+        <p:spPr>
+          <a:xfrm rot="16200000" flipH="1" flipV="1">
+            <a:off x="5747525" y="-567035"/>
+            <a:ext cx="2545252" cy="7014194"/>
+          </a:xfrm>
+          <a:prstGeom prst="bentConnector4">
+            <a:avLst>
+              <a:gd name="adj1" fmla="val -17653"/>
+              <a:gd name="adj2" fmla="val 109403"/>
+            </a:avLst>
+          </a:prstGeom>
+          <a:ln w="57150" cap="flat">
+            <a:solidFill>
+              <a:schemeClr val="accent6"/>
+            </a:solidFill>
+            <a:prstDash val="sysDot"/>
+            <a:round/>
+            <a:tailEnd type="triangle"/>
+          </a:ln>
+        </p:spPr>
+        <p:style>
+          <a:lnRef idx="1">
+            <a:schemeClr val="accent1"/>
+          </a:lnRef>
+          <a:fillRef idx="0">
+            <a:schemeClr val="accent1"/>
+          </a:fillRef>
+          <a:effectRef idx="0">
+            <a:schemeClr val="accent1"/>
+          </a:effectRef>
+          <a:fontRef idx="minor">
+            <a:schemeClr val="tx1"/>
+          </a:fontRef>
+        </p:style>
+      </p:cxnSp>
     </p:spTree>
     <p:extLst>
       <p:ext uri="{BB962C8B-B14F-4D97-AF65-F5344CB8AC3E}">
-        <p14:creationId xmlns:p14="http://schemas.microsoft.com/office/powerpoint/2010/main" val="2535186827"/>
+        <p14:creationId xmlns:p14="http://schemas.microsoft.com/office/powerpoint/2010/main" val="3768461845"/>
       </p:ext>
     </p:extLst>
   </p:cSld>

</xml_diff>